<commit_message>
Added changes to bucket list data flow model
</commit_message>
<xml_diff>
--- a/docs/sprint2/archives/bucket-list-data-flow-model.pptx
+++ b/docs/sprint2/archives/bucket-list-data-flow-model.pptx
@@ -289,7 +289,7 @@
             <a:fld id="{6B1F0B62-E2F0-42B0-BC12-33FFF6C65943}" type="datetimeFigureOut">
               <a:rPr lang="en-IN" smtClean="0"/>
               <a:pPr/>
-              <a:t>17-11-2016</a:t>
+              <a:t>23-11-2016</a:t>
             </a:fld>
             <a:endParaRPr lang="en-IN"/>
           </a:p>
@@ -456,7 +456,7 @@
             <a:fld id="{6B1F0B62-E2F0-42B0-BC12-33FFF6C65943}" type="datetimeFigureOut">
               <a:rPr lang="en-IN" smtClean="0"/>
               <a:pPr/>
-              <a:t>17-11-2016</a:t>
+              <a:t>23-11-2016</a:t>
             </a:fld>
             <a:endParaRPr lang="en-IN"/>
           </a:p>
@@ -633,7 +633,7 @@
             <a:fld id="{6B1F0B62-E2F0-42B0-BC12-33FFF6C65943}" type="datetimeFigureOut">
               <a:rPr lang="en-IN" smtClean="0"/>
               <a:pPr/>
-              <a:t>17-11-2016</a:t>
+              <a:t>23-11-2016</a:t>
             </a:fld>
             <a:endParaRPr lang="en-IN"/>
           </a:p>
@@ -800,7 +800,7 @@
             <a:fld id="{6B1F0B62-E2F0-42B0-BC12-33FFF6C65943}" type="datetimeFigureOut">
               <a:rPr lang="en-IN" smtClean="0"/>
               <a:pPr/>
-              <a:t>17-11-2016</a:t>
+              <a:t>23-11-2016</a:t>
             </a:fld>
             <a:endParaRPr lang="en-IN"/>
           </a:p>
@@ -1043,7 +1043,7 @@
             <a:fld id="{6B1F0B62-E2F0-42B0-BC12-33FFF6C65943}" type="datetimeFigureOut">
               <a:rPr lang="en-IN" smtClean="0"/>
               <a:pPr/>
-              <a:t>17-11-2016</a:t>
+              <a:t>23-11-2016</a:t>
             </a:fld>
             <a:endParaRPr lang="en-IN"/>
           </a:p>
@@ -1328,7 +1328,7 @@
             <a:fld id="{6B1F0B62-E2F0-42B0-BC12-33FFF6C65943}" type="datetimeFigureOut">
               <a:rPr lang="en-IN" smtClean="0"/>
               <a:pPr/>
-              <a:t>17-11-2016</a:t>
+              <a:t>23-11-2016</a:t>
             </a:fld>
             <a:endParaRPr lang="en-IN"/>
           </a:p>
@@ -1747,7 +1747,7 @@
             <a:fld id="{6B1F0B62-E2F0-42B0-BC12-33FFF6C65943}" type="datetimeFigureOut">
               <a:rPr lang="en-IN" smtClean="0"/>
               <a:pPr/>
-              <a:t>17-11-2016</a:t>
+              <a:t>23-11-2016</a:t>
             </a:fld>
             <a:endParaRPr lang="en-IN"/>
           </a:p>
@@ -1862,7 +1862,7 @@
             <a:fld id="{6B1F0B62-E2F0-42B0-BC12-33FFF6C65943}" type="datetimeFigureOut">
               <a:rPr lang="en-IN" smtClean="0"/>
               <a:pPr/>
-              <a:t>17-11-2016</a:t>
+              <a:t>23-11-2016</a:t>
             </a:fld>
             <a:endParaRPr lang="en-IN"/>
           </a:p>
@@ -1954,7 +1954,7 @@
             <a:fld id="{6B1F0B62-E2F0-42B0-BC12-33FFF6C65943}" type="datetimeFigureOut">
               <a:rPr lang="en-IN" smtClean="0"/>
               <a:pPr/>
-              <a:t>17-11-2016</a:t>
+              <a:t>23-11-2016</a:t>
             </a:fld>
             <a:endParaRPr lang="en-IN"/>
           </a:p>
@@ -2228,7 +2228,7 @@
             <a:fld id="{6B1F0B62-E2F0-42B0-BC12-33FFF6C65943}" type="datetimeFigureOut">
               <a:rPr lang="en-IN" smtClean="0"/>
               <a:pPr/>
-              <a:t>17-11-2016</a:t>
+              <a:t>23-11-2016</a:t>
             </a:fld>
             <a:endParaRPr lang="en-IN"/>
           </a:p>
@@ -2478,7 +2478,7 @@
             <a:fld id="{6B1F0B62-E2F0-42B0-BC12-33FFF6C65943}" type="datetimeFigureOut">
               <a:rPr lang="en-IN" smtClean="0"/>
               <a:pPr/>
-              <a:t>17-11-2016</a:t>
+              <a:t>23-11-2016</a:t>
             </a:fld>
             <a:endParaRPr lang="en-IN"/>
           </a:p>
@@ -2688,7 +2688,7 @@
             <a:fld id="{6B1F0B62-E2F0-42B0-BC12-33FFF6C65943}" type="datetimeFigureOut">
               <a:rPr lang="en-IN" smtClean="0"/>
               <a:pPr/>
-              <a:t>17-11-2016</a:t>
+              <a:t>23-11-2016</a:t>
             </a:fld>
             <a:endParaRPr lang="en-IN"/>
           </a:p>
@@ -3207,12 +3207,12 @@
               <a:t>&lt;&lt;</a:t>
             </a:r>
             <a:r>
-              <a:rPr lang="en-US" sz="1200" dirty="0" smtClean="0">
+              <a:rPr lang="en-US" sz="1200" dirty="0" err="1" smtClean="0">
                 <a:solidFill>
                   <a:sysClr val="windowText" lastClr="000000"/>
                 </a:solidFill>
               </a:rPr>
-              <a:t>session info</a:t>
+              <a:t>datastore</a:t>
             </a:r>
             <a:r>
               <a:rPr lang="en-US" sz="1200" dirty="0" smtClean="0">
@@ -3222,11 +3222,6 @@
               </a:rPr>
               <a:t>&gt;&gt;</a:t>
             </a:r>
-            <a:endParaRPr lang="en-US" sz="1200" dirty="0" smtClean="0">
-              <a:solidFill>
-                <a:sysClr val="windowText" lastClr="000000"/>
-              </a:solidFill>
-            </a:endParaRPr>
           </a:p>
           <a:p>
             <a:pPr algn="ctr"/>
@@ -3236,7 +3231,7 @@
                   <a:sysClr val="windowText" lastClr="000000"/>
                 </a:solidFill>
               </a:rPr>
-              <a:t>Authentication System</a:t>
+              <a:t>Bucket information</a:t>
             </a:r>
             <a:endParaRPr lang="en-US" dirty="0">
               <a:solidFill>
@@ -3330,7 +3325,7 @@
                   <a:sysClr val="windowText" lastClr="000000"/>
                 </a:solidFill>
               </a:rPr>
-              <a:t>Query authentication system if user is logged in</a:t>
+              <a:t>The bucket’s data is fetched</a:t>
             </a:r>
             <a:endParaRPr lang="en-US" dirty="0">
               <a:solidFill>
@@ -3443,7 +3438,7 @@
         <p:spPr>
           <a:xfrm>
             <a:off x="3808940" y="4077072"/>
-            <a:ext cx="1364522" cy="461665"/>
+            <a:ext cx="1364522" cy="276999"/>
           </a:xfrm>
           <a:prstGeom prst="rect">
             <a:avLst/>
@@ -3457,12 +3452,16 @@
           <a:lstStyle/>
           <a:p>
             <a:r>
-              <a:rPr lang="en-US" sz="1200" dirty="0"/>
-              <a:t>a</a:t>
-            </a:r>
-            <a:r>
               <a:rPr lang="en-US" sz="1200" dirty="0" smtClean="0"/>
-              <a:t>uthentication status</a:t>
+              <a:t>b</a:t>
+            </a:r>
+            <a:r>
+              <a:rPr lang="en-US" sz="1200" dirty="0" smtClean="0"/>
+              <a:t>ucket </a:t>
+            </a:r>
+            <a:r>
+              <a:rPr lang="en-US" sz="1200" dirty="0" smtClean="0"/>
+              <a:t>data</a:t>
             </a:r>
             <a:endParaRPr lang="en-US" sz="1200" dirty="0"/>
           </a:p>

</xml_diff>